<commit_message>
Fix font names - use 'Ogg TRIAL' as actual family name
</commit_message>
<xml_diff>
--- a/Bailey_Etsy_Reset_Redesign_v1.pptx
+++ b/Bailey_Etsy_Reset_Redesign_v1.pptx
@@ -3247,7 +3247,7 @@
                 <a:solidFill>
                   <a:srgbClr val="FFFFFF"/>
                 </a:solidFill>
-                <a:latin typeface="Satoshi"/>
+                <a:latin typeface="Arial"/>
               </a:defRPr>
             </a:pPr>
             <a:r>
@@ -3281,7 +3281,7 @@
                 <a:solidFill>
                   <a:srgbClr val="1B8A8A"/>
                 </a:solidFill>
-                <a:latin typeface="Ogg"/>
+                <a:latin typeface="Ogg TRIAL"/>
               </a:defRPr>
             </a:pPr>
             <a:r>
@@ -3315,7 +3315,7 @@
                 <a:solidFill>
                   <a:srgbClr val="2D3436"/>
                 </a:solidFill>
-                <a:latin typeface="Ogg"/>
+                <a:latin typeface="Ogg TRIAL"/>
               </a:defRPr>
             </a:pPr>
             <a:r>
@@ -3349,7 +3349,7 @@
                 <a:solidFill>
                   <a:srgbClr val="636E72"/>
                 </a:solidFill>
-                <a:latin typeface="Satoshi"/>
+                <a:latin typeface="Arial"/>
               </a:defRPr>
             </a:pPr>
             <a:r>
@@ -3409,7 +3409,7 @@
                 <a:solidFill>
                   <a:srgbClr val="FFFFFF"/>
                 </a:solidFill>
-                <a:latin typeface="Satoshi"/>
+                <a:latin typeface="Arial"/>
               </a:rPr>
               <a:t>with </a:t>
             </a:r>
@@ -3418,7 +3418,7 @@
                 <a:solidFill>
                   <a:srgbClr val="FFFFFF"/>
                 </a:solidFill>
-                <a:latin typeface="Satoshi"/>
+                <a:latin typeface="Arial"/>
               </a:rPr>
               <a:t>Bailey Vann</a:t>
             </a:r>
@@ -3427,7 +3427,7 @@
                 <a:solidFill>
                   <a:srgbClr val="FFFFFF"/>
                 </a:solidFill>
-                <a:latin typeface="Satoshi"/>
+                <a:latin typeface="Arial"/>
               </a:rPr>
               <a:t>  •  Top 0.1% Etsy Seller  •  $1M+ in Digital Product Sales</a:t>
             </a:r>
@@ -3571,7 +3571,7 @@
                 <a:solidFill>
                   <a:srgbClr val="FFFFFF"/>
                 </a:solidFill>
-                <a:latin typeface="Ogg"/>
+                <a:latin typeface="Ogg TRIAL"/>
               </a:defRPr>
             </a:pPr>
             <a:r>
@@ -3605,7 +3605,7 @@
                 <a:solidFill>
                   <a:srgbClr val="E07B6C"/>
                 </a:solidFill>
-                <a:latin typeface="Ogg"/>
+                <a:latin typeface="Ogg TRIAL"/>
               </a:defRPr>
             </a:pPr>
             <a:r>
@@ -3708,7 +3708,7 @@
                 <a:solidFill>
                   <a:srgbClr val="636E72"/>
                 </a:solidFill>
-                <a:latin typeface="Satoshi"/>
+                <a:latin typeface="Arial"/>
               </a:defRPr>
             </a:pPr>
             <a:r>
@@ -3742,7 +3742,7 @@
                 <a:solidFill>
                   <a:srgbClr val="2D3436"/>
                 </a:solidFill>
-                <a:latin typeface="Ogg"/>
+                <a:latin typeface="Ogg TRIAL"/>
               </a:defRPr>
             </a:pPr>
             <a:r>
@@ -3780,7 +3780,7 @@
                 <a:solidFill>
                   <a:srgbClr val="F4A89A"/>
                 </a:solidFill>
-                <a:latin typeface="Ogg"/>
+                <a:latin typeface="Ogg TRIAL"/>
               </a:defRPr>
             </a:pPr>
             <a:r>
@@ -3883,7 +3883,7 @@
                 <a:solidFill>
                   <a:srgbClr val="2D3436"/>
                 </a:solidFill>
-                <a:latin typeface="Ogg"/>
+                <a:latin typeface="Ogg TRIAL"/>
               </a:defRPr>
             </a:pPr>
             <a:r>
@@ -3973,7 +3973,7 @@
                 <a:solidFill>
                   <a:srgbClr val="FFFFFF"/>
                 </a:solidFill>
-                <a:latin typeface="Satoshi"/>
+                <a:latin typeface="Arial"/>
               </a:defRPr>
             </a:pPr>
             <a:r>
@@ -4032,7 +4032,7 @@
                 <a:solidFill>
                   <a:srgbClr val="FFFFFF"/>
                 </a:solidFill>
-                <a:latin typeface="Satoshi"/>
+                <a:latin typeface="Arial"/>
               </a:defRPr>
             </a:pPr>
             <a:r>
@@ -4135,7 +4135,7 @@
                 <a:solidFill>
                   <a:srgbClr val="E07B6C"/>
                 </a:solidFill>
-                <a:latin typeface="Ogg"/>
+                <a:latin typeface="Ogg TRIAL"/>
               </a:defRPr>
             </a:pPr>
             <a:r>
@@ -4169,7 +4169,7 @@
                 <a:solidFill>
                   <a:srgbClr val="2D3436"/>
                 </a:solidFill>
-                <a:latin typeface="Satoshi"/>
+                <a:latin typeface="Arial"/>
               </a:defRPr>
             </a:pPr>
             <a:r>
@@ -11139,7 +11139,7 @@
                 <a:solidFill>
                   <a:srgbClr val="636E72"/>
                 </a:solidFill>
-                <a:latin typeface="Satoshi"/>
+                <a:latin typeface="Arial"/>
               </a:defRPr>
             </a:pPr>
             <a:r>
@@ -11246,7 +11246,7 @@
                 <a:solidFill>
                   <a:srgbClr val="1B8A8A"/>
                 </a:solidFill>
-                <a:latin typeface="Ogg"/>
+                <a:latin typeface="Ogg TRIAL"/>
               </a:defRPr>
             </a:pPr>
             <a:r>
@@ -11280,7 +11280,7 @@
                 <a:solidFill>
                   <a:srgbClr val="2D3436"/>
                 </a:solidFill>
-                <a:latin typeface="Satoshi"/>
+                <a:latin typeface="Arial"/>
               </a:defRPr>
             </a:pPr>
             <a:r>
@@ -11370,7 +11370,7 @@
                 <a:solidFill>
                   <a:srgbClr val="636E72"/>
                 </a:solidFill>
-                <a:latin typeface="Satoshi"/>
+                <a:latin typeface="Arial"/>
               </a:defRPr>
             </a:pPr>
             <a:r>
@@ -11533,7 +11533,7 @@
                 <a:solidFill>
                   <a:srgbClr val="E07B6C"/>
                 </a:solidFill>
-                <a:latin typeface="Satoshi"/>
+                <a:latin typeface="Arial"/>
               </a:defRPr>
             </a:pPr>
             <a:r>
@@ -11567,7 +11567,7 @@
                 <a:solidFill>
                   <a:srgbClr val="636E72"/>
                 </a:solidFill>
-                <a:latin typeface="Satoshi"/>
+                <a:latin typeface="Arial"/>
               </a:defRPr>
             </a:pPr>
             <a:r>
@@ -11670,7 +11670,7 @@
                 <a:solidFill>
                   <a:srgbClr val="2D3436"/>
                 </a:solidFill>
-                <a:latin typeface="Ogg"/>
+                <a:latin typeface="Ogg TRIAL"/>
               </a:defRPr>
             </a:pPr>
             <a:r>
@@ -11704,7 +11704,7 @@
                 <a:solidFill>
                   <a:srgbClr val="2D3436"/>
                 </a:solidFill>
-                <a:latin typeface="Satoshi"/>
+                <a:latin typeface="Arial"/>
               </a:defRPr>
             </a:pPr>
             <a:r>
@@ -11738,7 +11738,7 @@
                 <a:solidFill>
                   <a:srgbClr val="9CA3A8"/>
                 </a:solidFill>
-                <a:latin typeface="Ogg"/>
+                <a:latin typeface="Ogg TRIAL"/>
               </a:defRPr>
             </a:pPr>
             <a:r>
@@ -11772,7 +11772,7 @@
                 <a:solidFill>
                   <a:srgbClr val="F4A89A"/>
                 </a:solidFill>
-                <a:latin typeface="Ogg"/>
+                <a:latin typeface="Ogg TRIAL"/>
               </a:defRPr>
             </a:pPr>
             <a:r>
@@ -11806,7 +11806,7 @@
                 <a:solidFill>
                   <a:srgbClr val="9CA3A8"/>
                 </a:solidFill>
-                <a:latin typeface="Ogg"/>
+                <a:latin typeface="Ogg TRIAL"/>
               </a:defRPr>
             </a:pPr>
             <a:r>
@@ -11840,7 +11840,7 @@
                 <a:solidFill>
                   <a:srgbClr val="F4A89A"/>
                 </a:solidFill>
-                <a:latin typeface="Ogg"/>
+                <a:latin typeface="Ogg TRIAL"/>
               </a:defRPr>
             </a:pPr>
             <a:r>
@@ -11874,7 +11874,7 @@
                 <a:solidFill>
                   <a:srgbClr val="9CA3A8"/>
                 </a:solidFill>
-                <a:latin typeface="Ogg"/>
+                <a:latin typeface="Ogg TRIAL"/>
               </a:defRPr>
             </a:pPr>
             <a:r>
@@ -11908,7 +11908,7 @@
                 <a:solidFill>
                   <a:srgbClr val="F4A89A"/>
                 </a:solidFill>
-                <a:latin typeface="Ogg"/>
+                <a:latin typeface="Ogg TRIAL"/>
               </a:defRPr>
             </a:pPr>
             <a:r>
@@ -11942,7 +11942,7 @@
                 <a:solidFill>
                   <a:srgbClr val="9CA3A8"/>
                 </a:solidFill>
-                <a:latin typeface="Ogg"/>
+                <a:latin typeface="Ogg TRIAL"/>
               </a:defRPr>
             </a:pPr>
             <a:r>
@@ -11976,7 +11976,7 @@
                 <a:solidFill>
                   <a:srgbClr val="F4A89A"/>
                 </a:solidFill>
-                <a:latin typeface="Ogg"/>
+                <a:latin typeface="Ogg TRIAL"/>
               </a:defRPr>
             </a:pPr>
             <a:r>
@@ -12010,7 +12010,7 @@
                 <a:solidFill>
                   <a:srgbClr val="9CA3A8"/>
                 </a:solidFill>
-                <a:latin typeface="Ogg"/>
+                <a:latin typeface="Ogg TRIAL"/>
               </a:defRPr>
             </a:pPr>
             <a:r>
@@ -12044,7 +12044,7 @@
                 <a:solidFill>
                   <a:srgbClr val="F4A89A"/>
                 </a:solidFill>
-                <a:latin typeface="Ogg"/>
+                <a:latin typeface="Ogg TRIAL"/>
               </a:defRPr>
             </a:pPr>
             <a:r>
@@ -12078,7 +12078,7 @@
                 <a:solidFill>
                   <a:srgbClr val="9CA3A8"/>
                 </a:solidFill>
-                <a:latin typeface="Ogg"/>
+                <a:latin typeface="Ogg TRIAL"/>
               </a:defRPr>
             </a:pPr>
             <a:r>
@@ -12112,7 +12112,7 @@
                 <a:solidFill>
                   <a:srgbClr val="F4A89A"/>
                 </a:solidFill>
-                <a:latin typeface="Ogg"/>
+                <a:latin typeface="Ogg TRIAL"/>
               </a:defRPr>
             </a:pPr>
             <a:r>
@@ -12146,7 +12146,7 @@
                 <a:solidFill>
                   <a:srgbClr val="9CA3A8"/>
                 </a:solidFill>
-                <a:latin typeface="Ogg"/>
+                <a:latin typeface="Ogg TRIAL"/>
               </a:defRPr>
             </a:pPr>
             <a:r>
@@ -12180,7 +12180,7 @@
                 <a:solidFill>
                   <a:srgbClr val="F4A89A"/>
                 </a:solidFill>
-                <a:latin typeface="Ogg"/>
+                <a:latin typeface="Ogg TRIAL"/>
               </a:defRPr>
             </a:pPr>
             <a:r>
@@ -12214,7 +12214,7 @@
                 <a:solidFill>
                   <a:srgbClr val="9CA3A8"/>
                 </a:solidFill>
-                <a:latin typeface="Ogg"/>
+                <a:latin typeface="Ogg TRIAL"/>
               </a:defRPr>
             </a:pPr>
             <a:r>
@@ -12293,7 +12293,7 @@
                 <a:solidFill>
                   <a:srgbClr val="FFFFFF"/>
                 </a:solidFill>
-                <a:latin typeface="Satoshi"/>
+                <a:latin typeface="Arial"/>
               </a:defRPr>
             </a:pPr>
             <a:r>
@@ -12405,7 +12405,7 @@
                 <a:solidFill>
                   <a:srgbClr val="2D3436"/>
                 </a:solidFill>
-                <a:latin typeface="Ogg"/>
+                <a:latin typeface="Ogg TRIAL"/>
               </a:defRPr>
             </a:pPr>
             <a:r>
@@ -12460,7 +12460,7 @@
                 <a:solidFill>
                   <a:srgbClr val="FFFFFF"/>
                 </a:solidFill>
-                <a:latin typeface="Satoshi"/>
+                <a:latin typeface="Arial"/>
               </a:defRPr>
             </a:pPr>
             <a:r>
@@ -12494,7 +12494,7 @@
                 <a:solidFill>
                   <a:srgbClr val="636E72"/>
                 </a:solidFill>
-                <a:latin typeface="Satoshi"/>
+                <a:latin typeface="Arial"/>
               </a:defRPr>
             </a:pPr>
             <a:r>
@@ -12597,7 +12597,7 @@
                 <a:solidFill>
                   <a:srgbClr val="636E72"/>
                 </a:solidFill>
-                <a:latin typeface="Satoshi"/>
+                <a:latin typeface="Arial"/>
               </a:defRPr>
             </a:pPr>
             <a:r>
@@ -12631,7 +12631,7 @@
                 <a:solidFill>
                   <a:srgbClr val="9CA3A8"/>
                 </a:solidFill>
-                <a:latin typeface="Ogg"/>
+                <a:latin typeface="Ogg TRIAL"/>
               </a:defRPr>
             </a:pPr>
             <a:r>
@@ -12708,7 +12708,7 @@
                 <a:solidFill>
                   <a:srgbClr val="E07B6C"/>
                 </a:solidFill>
-                <a:latin typeface="Ogg"/>
+                <a:latin typeface="Ogg TRIAL"/>
               </a:defRPr>
             </a:pPr>
             <a:r>
@@ -12742,7 +12742,7 @@
                 <a:solidFill>
                   <a:srgbClr val="E07B6C"/>
                 </a:solidFill>
-                <a:latin typeface="Ogg"/>
+                <a:latin typeface="Ogg TRIAL"/>
               </a:defRPr>
             </a:pPr>
             <a:r>
@@ -12802,7 +12802,7 @@
                 <a:solidFill>
                   <a:srgbClr val="FFFFFF"/>
                 </a:solidFill>
-                <a:latin typeface="Ogg"/>
+                <a:latin typeface="Ogg TRIAL"/>
               </a:defRPr>
             </a:pPr>
             <a:r>
@@ -12995,7 +12995,7 @@
                 <a:solidFill>
                   <a:srgbClr val="2D3436"/>
                 </a:solidFill>
-                <a:latin typeface="Ogg"/>
+                <a:latin typeface="Ogg TRIAL"/>
               </a:defRPr>
             </a:pPr>
             <a:r>
@@ -13081,7 +13081,7 @@
                 <a:solidFill>
                   <a:srgbClr val="FFFFFF"/>
                 </a:solidFill>
-                <a:latin typeface="Satoshi"/>
+                <a:latin typeface="Arial"/>
               </a:defRPr>
             </a:pPr>
             <a:r>
@@ -13115,7 +13115,7 @@
                 <a:solidFill>
                   <a:srgbClr val="FFFFFF"/>
                 </a:solidFill>
-                <a:latin typeface="Ogg"/>
+                <a:latin typeface="Ogg TRIAL"/>
               </a:defRPr>
             </a:pPr>
             <a:r>
@@ -13313,7 +13313,7 @@
                 <a:solidFill>
                   <a:srgbClr val="2D3436"/>
                 </a:solidFill>
-                <a:latin typeface="Ogg"/>
+                <a:latin typeface="Ogg TRIAL"/>
               </a:defRPr>
             </a:pPr>
             <a:r>
@@ -13411,7 +13411,7 @@
                 <a:solidFill>
                   <a:srgbClr val="FFFFFF"/>
                 </a:solidFill>
-                <a:latin typeface="Satoshi"/>
+                <a:latin typeface="Arial"/>
               </a:defRPr>
             </a:pPr>
             <a:r>
@@ -13445,7 +13445,7 @@
                 <a:solidFill>
                   <a:srgbClr val="636E72"/>
                 </a:solidFill>
-                <a:latin typeface="Satoshi"/>
+                <a:latin typeface="Arial"/>
               </a:defRPr>
             </a:pPr>
             <a:r>
@@ -13552,7 +13552,7 @@
                 <a:solidFill>
                   <a:srgbClr val="636E72"/>
                 </a:solidFill>
-                <a:latin typeface="Satoshi"/>
+                <a:latin typeface="Arial"/>
               </a:defRPr>
             </a:pPr>
             <a:r>
@@ -13638,7 +13638,7 @@
                 <a:solidFill>
                   <a:srgbClr val="FFFFFF"/>
                 </a:solidFill>
-                <a:latin typeface="Satoshi"/>
+                <a:latin typeface="Arial"/>
               </a:defRPr>
             </a:pPr>
             <a:r>
@@ -13672,7 +13672,7 @@
                 <a:solidFill>
                   <a:srgbClr val="FFFFFF"/>
                 </a:solidFill>
-                <a:latin typeface="Ogg"/>
+                <a:latin typeface="Ogg TRIAL"/>
               </a:defRPr>
             </a:pPr>
             <a:r>
@@ -13706,7 +13706,7 @@
                 <a:solidFill>
                   <a:srgbClr val="2D3436"/>
                 </a:solidFill>
-                <a:latin typeface="Satoshi"/>
+                <a:latin typeface="Arial"/>
               </a:defRPr>
             </a:pPr>
             <a:r>
@@ -13785,7 +13785,7 @@
                 <a:solidFill>
                   <a:srgbClr val="FFFFFF"/>
                 </a:solidFill>
-                <a:latin typeface="Ogg"/>
+                <a:latin typeface="Ogg TRIAL"/>
               </a:defRPr>
             </a:pPr>
             <a:r>
@@ -13819,7 +13819,7 @@
                 <a:solidFill>
                   <a:srgbClr val="636E72"/>
                 </a:solidFill>
-                <a:latin typeface="Satoshi"/>
+                <a:latin typeface="Arial"/>
               </a:defRPr>
             </a:pPr>
             <a:r>
@@ -14017,7 +14017,7 @@
                 <a:solidFill>
                   <a:srgbClr val="2D3436"/>
                 </a:solidFill>
-                <a:latin typeface="Ogg"/>
+                <a:latin typeface="Ogg TRIAL"/>
               </a:defRPr>
             </a:pPr>
             <a:r>
@@ -14184,7 +14184,7 @@
                 <a:solidFill>
                   <a:srgbClr val="636E72"/>
                 </a:solidFill>
-                <a:latin typeface="Satoshi"/>
+                <a:latin typeface="Arial"/>
               </a:defRPr>
             </a:pPr>
             <a:r>
@@ -14287,7 +14287,7 @@
                 <a:solidFill>
                   <a:srgbClr val="2D3436"/>
                 </a:solidFill>
-                <a:latin typeface="Ogg"/>
+                <a:latin typeface="Ogg TRIAL"/>
               </a:defRPr>
             </a:pPr>
             <a:r>
@@ -14418,7 +14418,7 @@
                 <a:solidFill>
                   <a:srgbClr val="636E72"/>
                 </a:solidFill>
-                <a:latin typeface="Satoshi"/>
+                <a:latin typeface="Arial"/>
               </a:defRPr>
             </a:pPr>
             <a:r>
@@ -14471,7 +14471,7 @@
                 <a:solidFill>
                   <a:srgbClr val="FFFFFF"/>
                 </a:solidFill>
-                <a:latin typeface="Ogg"/>
+                <a:latin typeface="Ogg TRIAL"/>
               </a:defRPr>
             </a:pPr>
             <a:r>
@@ -14602,7 +14602,7 @@
                 <a:solidFill>
                   <a:srgbClr val="636E72"/>
                 </a:solidFill>
-                <a:latin typeface="Satoshi"/>
+                <a:latin typeface="Arial"/>
               </a:defRPr>
             </a:pPr>
             <a:r>
@@ -14655,7 +14655,7 @@
                 <a:solidFill>
                   <a:srgbClr val="FFFFFF"/>
                 </a:solidFill>
-                <a:latin typeface="Ogg"/>
+                <a:latin typeface="Ogg TRIAL"/>
               </a:defRPr>
             </a:pPr>
             <a:r>
@@ -14689,7 +14689,7 @@
                 <a:solidFill>
                   <a:srgbClr val="636E72"/>
                 </a:solidFill>
-                <a:latin typeface="Ogg"/>
+                <a:latin typeface="Ogg TRIAL"/>
               </a:defRPr>
             </a:pPr>
             <a:r>
@@ -14749,7 +14749,7 @@
                 <a:solidFill>
                   <a:srgbClr val="FFFFFF"/>
                 </a:solidFill>
-                <a:latin typeface="Ogg"/>
+                <a:latin typeface="Ogg TRIAL"/>
               </a:defRPr>
             </a:pPr>
             <a:r>
@@ -14811,7 +14811,7 @@
                 <a:solidFill>
                   <a:srgbClr val="1B8A8A"/>
                 </a:solidFill>
-                <a:latin typeface="Ogg"/>
+                <a:latin typeface="Ogg TRIAL"/>
               </a:defRPr>
             </a:pPr>
             <a:r>
@@ -14873,7 +14873,7 @@
                 <a:solidFill>
                   <a:srgbClr val="FFFFFF"/>
                 </a:solidFill>
-                <a:latin typeface="Ogg"/>
+                <a:latin typeface="Ogg TRIAL"/>
               </a:defRPr>
             </a:pPr>
             <a:r>
@@ -14907,7 +14907,7 @@
                 <a:solidFill>
                   <a:srgbClr val="FFFFFF"/>
                 </a:solidFill>
-                <a:latin typeface="Satoshi"/>
+                <a:latin typeface="Arial"/>
               </a:defRPr>
             </a:pPr>
             <a:r>
@@ -15053,7 +15053,7 @@
                 <a:solidFill>
                   <a:srgbClr val="2D3436"/>
                 </a:solidFill>
-                <a:latin typeface="Ogg"/>
+                <a:latin typeface="Ogg TRIAL"/>
               </a:defRPr>
             </a:pPr>
             <a:r>
@@ -15242,7 +15242,7 @@
                 <a:solidFill>
                   <a:srgbClr val="FFFFFF"/>
                 </a:solidFill>
-                <a:latin typeface="Ogg"/>
+                <a:latin typeface="Ogg TRIAL"/>
               </a:defRPr>
             </a:pPr>
             <a:r>
@@ -15328,7 +15328,7 @@
                 <a:solidFill>
                   <a:srgbClr val="2D3436"/>
                 </a:solidFill>
-                <a:latin typeface="Satoshi"/>
+                <a:latin typeface="Arial"/>
               </a:defRPr>
             </a:pPr>
             <a:r>
@@ -15487,7 +15487,7 @@
                 <a:solidFill>
                   <a:srgbClr val="636E72"/>
                 </a:solidFill>
-                <a:latin typeface="Ogg"/>
+                <a:latin typeface="Ogg TRIAL"/>
               </a:defRPr>
             </a:pPr>
             <a:r>
@@ -15564,7 +15564,7 @@
                 <a:solidFill>
                   <a:srgbClr val="2D3436"/>
                 </a:solidFill>
-                <a:latin typeface="Satoshi"/>
+                <a:latin typeface="Arial"/>
               </a:defRPr>
             </a:pPr>
             <a:r>
@@ -15651,7 +15651,7 @@
                 <a:solidFill>
                   <a:srgbClr val="E07B6C"/>
                 </a:solidFill>
-                <a:latin typeface="Satoshi"/>
+                <a:latin typeface="Arial"/>
               </a:defRPr>
             </a:pPr>
             <a:r>
@@ -15711,7 +15711,7 @@
                 <a:solidFill>
                   <a:srgbClr val="1B8A8A"/>
                 </a:solidFill>
-                <a:latin typeface="Ogg"/>
+                <a:latin typeface="Ogg TRIAL"/>
               </a:defRPr>
             </a:pPr>
             <a:r>

</xml_diff>